<commit_message>
End of the morning
</commit_message>
<xml_diff>
--- a/Slides/02 - Beginning Code First.pptx
+++ b/Slides/02 - Beginning Code First.pptx
@@ -4625,11 +4625,7 @@
           <a:p>
             <a:r>
               <a:rPr lang="en-US" dirty="0" smtClean="0"/>
-              <a:t>Value types </a:t>
-            </a:r>
-            <a:r>
-              <a:rPr lang="en-US" dirty="0" smtClean="0"/>
-              <a:t>and </a:t>
+              <a:t>Value types and </a:t>
             </a:r>
             <a:r>
               <a:rPr lang="en-US" dirty="0" err="1" smtClean="0"/>
@@ -4656,11 +4652,7 @@
           <a:p>
             <a:r>
               <a:rPr lang="en-US" dirty="0" smtClean="0"/>
-              <a:t>Dates and numbers are </a:t>
-            </a:r>
-            <a:r>
-              <a:rPr lang="en-US" dirty="0" smtClean="0"/>
-              <a:t>value types in .NET</a:t>
+              <a:t>Dates and numbers are value types in .NET</a:t>
             </a:r>
           </a:p>
           <a:p>
@@ -4669,15 +4661,7 @@
           <a:p>
             <a:r>
               <a:rPr lang="en-US" dirty="0" smtClean="0"/>
-              <a:t>Value type</a:t>
-            </a:r>
-            <a:r>
-              <a:rPr lang="en-US" dirty="0" smtClean="0"/>
-              <a:t> properties </a:t>
-            </a:r>
-            <a:r>
-              <a:rPr lang="en-US" dirty="0" smtClean="0"/>
-              <a:t>must be marked as </a:t>
+              <a:t>Value type properties must be marked as </a:t>
             </a:r>
             <a:r>
               <a:rPr lang="en-US" dirty="0" err="1" smtClean="0"/>
@@ -4994,9 +4978,35 @@
           <a:p>
             <a:r>
               <a:rPr lang="en-US" dirty="0" smtClean="0"/>
-              <a:t>Attributes and database control</a:t>
-            </a:r>
-            <a:endParaRPr lang="en-US" dirty="0"/>
+              <a:t>Attributes and database </a:t>
+            </a:r>
+            <a:r>
+              <a:rPr lang="en-US" dirty="0" smtClean="0"/>
+              <a:t>control</a:t>
+            </a:r>
+            <a:br>
+              <a:rPr lang="en-US" dirty="0" smtClean="0"/>
+            </a:br>
+            <a:r>
+              <a:rPr lang="en-US" dirty="0" smtClean="0"/>
+              <a:t/>
+            </a:r>
+            <a:br>
+              <a:rPr lang="en-US" dirty="0" smtClean="0"/>
+            </a:br>
+            <a:r>
+              <a:rPr lang="en-US" dirty="0" smtClean="0">
+                <a:solidFill>
+                  <a:srgbClr val="FF0000"/>
+                </a:solidFill>
+              </a:rPr>
+              <a:t>(warning... This demo is going to fail. Well, sort of.)</a:t>
+            </a:r>
+            <a:endParaRPr lang="en-US" dirty="0">
+              <a:solidFill>
+                <a:srgbClr val="FF0000"/>
+              </a:solidFill>
+            </a:endParaRPr>
           </a:p>
         </p:txBody>
       </p:sp>
@@ -5181,11 +5191,34 @@
             </a:endParaRPr>
           </a:p>
           <a:p>
-            <a:pPr marL="0" indent="0">
-              <a:buNone/>
-            </a:pPr>
-            <a:r>
-              <a:rPr lang="en-US" dirty="0">
+            <a:endParaRPr lang="en-US" dirty="0"/>
+          </a:p>
+        </p:txBody>
+      </p:sp>
+      <p:sp>
+        <p:nvSpPr>
+          <p:cNvPr id="2" name="TextBox 1"/>
+          <p:cNvSpPr txBox="1"/>
+          <p:nvPr/>
+        </p:nvSpPr>
+        <p:spPr>
+          <a:xfrm>
+            <a:off x="773093" y="3532908"/>
+            <a:ext cx="10737273" cy="2062103"/>
+          </a:xfrm>
+          <a:prstGeom prst="rect">
+            <a:avLst/>
+          </a:prstGeom>
+          <a:noFill/>
+        </p:spPr>
+        <p:txBody>
+          <a:bodyPr wrap="square" rtlCol="0">
+            <a:spAutoFit/>
+          </a:bodyPr>
+          <a:lstStyle/>
+          <a:p>
+            <a:r>
+              <a:rPr lang="en-US" sz="3200">
                 <a:solidFill>
                   <a:srgbClr val="0000FF"/>
                 </a:solidFill>
@@ -5197,7 +5230,7 @@
               <a:t>public</a:t>
             </a:r>
             <a:r>
-              <a:rPr lang="en-US" dirty="0">
+              <a:rPr lang="en-US" sz="3200">
                 <a:solidFill>
                   <a:srgbClr val="000000"/>
                 </a:solidFill>
@@ -5209,7 +5242,7 @@
               <a:t> </a:t>
             </a:r>
             <a:r>
-              <a:rPr lang="en-US" dirty="0">
+              <a:rPr lang="en-US" sz="3200">
                 <a:solidFill>
                   <a:srgbClr val="0000FF"/>
                 </a:solidFill>
@@ -5221,7 +5254,7 @@
               <a:t>class</a:t>
             </a:r>
             <a:r>
-              <a:rPr lang="en-US" dirty="0">
+              <a:rPr lang="en-US" sz="3200">
                 <a:solidFill>
                   <a:srgbClr val="000000"/>
                 </a:solidFill>
@@ -5233,7 +5266,7 @@
               <a:t> </a:t>
             </a:r>
             <a:r>
-              <a:rPr lang="en-US" dirty="0" err="1">
+              <a:rPr lang="en-US" sz="3200">
                 <a:solidFill>
                   <a:srgbClr val="2B91AF"/>
                 </a:solidFill>
@@ -5245,7 +5278,7 @@
               <a:t>MusicStoreDbContext</a:t>
             </a:r>
             <a:r>
-              <a:rPr lang="en-US" dirty="0">
+              <a:rPr lang="en-US" sz="3200">
                 <a:solidFill>
                   <a:srgbClr val="000000"/>
                 </a:solidFill>
@@ -5257,7 +5290,7 @@
               <a:t> : </a:t>
             </a:r>
             <a:r>
-              <a:rPr lang="en-US" dirty="0" err="1">
+              <a:rPr lang="en-US" sz="3200">
                 <a:solidFill>
                   <a:srgbClr val="2B91AF"/>
                 </a:solidFill>
@@ -5268,22 +5301,10 @@
               </a:rPr>
               <a:t>DbContext</a:t>
             </a:r>
-            <a:endParaRPr lang="en-US" dirty="0">
-              <a:solidFill>
-                <a:srgbClr val="2B91AF"/>
-              </a:solidFill>
-              <a:highlight>
-                <a:srgbClr val="FFFFFF"/>
-              </a:highlight>
-              <a:latin typeface="Consolas" panose="020B0609020204030204" pitchFamily="49" charset="0"/>
-            </a:endParaRPr>
-          </a:p>
-          <a:p>
-            <a:pPr marL="0" indent="0">
-              <a:buNone/>
-            </a:pPr>
-            <a:r>
-              <a:rPr lang="en-US" dirty="0">
+          </a:p>
+          <a:p>
+            <a:r>
+              <a:rPr lang="en-US" sz="3200">
                 <a:solidFill>
                   <a:srgbClr val="000000"/>
                 </a:solidFill>
@@ -5296,11 +5317,8 @@
             </a:r>
           </a:p>
           <a:p>
-            <a:pPr marL="0" indent="0">
-              <a:buNone/>
-            </a:pPr>
-            <a:r>
-              <a:rPr lang="en-US" dirty="0" smtClean="0">
+            <a:r>
+              <a:rPr lang="en-US" sz="3200">
                 <a:solidFill>
                   <a:srgbClr val="0000FF"/>
                 </a:solidFill>
@@ -5312,7 +5330,7 @@
               <a:t>   public</a:t>
             </a:r>
             <a:r>
-              <a:rPr lang="en-US" dirty="0" smtClean="0">
+              <a:rPr lang="en-US" sz="3200">
                 <a:solidFill>
                   <a:srgbClr val="000000"/>
                 </a:solidFill>
@@ -5324,7 +5342,7 @@
               <a:t> </a:t>
             </a:r>
             <a:r>
-              <a:rPr lang="en-US" dirty="0" err="1">
+              <a:rPr lang="en-US" sz="3200">
                 <a:solidFill>
                   <a:srgbClr val="2B91AF"/>
                 </a:solidFill>
@@ -5336,7 +5354,7 @@
               <a:t>DbSet</a:t>
             </a:r>
             <a:r>
-              <a:rPr lang="en-US" dirty="0">
+              <a:rPr lang="en-US" sz="3200">
                 <a:solidFill>
                   <a:srgbClr val="000000"/>
                 </a:solidFill>
@@ -5348,7 +5366,7 @@
               <a:t>&lt;</a:t>
             </a:r>
             <a:r>
-              <a:rPr lang="en-US" dirty="0">
+              <a:rPr lang="en-US" sz="3200">
                 <a:solidFill>
                   <a:srgbClr val="2B91AF"/>
                 </a:solidFill>
@@ -5360,7 +5378,7 @@
               <a:t>Artist</a:t>
             </a:r>
             <a:r>
-              <a:rPr lang="en-US" dirty="0">
+              <a:rPr lang="en-US" sz="3200">
                 <a:solidFill>
                   <a:srgbClr val="000000"/>
                 </a:solidFill>
@@ -5372,7 +5390,7 @@
               <a:t>&gt; Artists { </a:t>
             </a:r>
             <a:r>
-              <a:rPr lang="en-US" dirty="0">
+              <a:rPr lang="en-US" sz="3200">
                 <a:solidFill>
                   <a:srgbClr val="0000FF"/>
                 </a:solidFill>
@@ -5384,7 +5402,7 @@
               <a:t>get</a:t>
             </a:r>
             <a:r>
-              <a:rPr lang="en-US" dirty="0">
+              <a:rPr lang="en-US" sz="3200">
                 <a:solidFill>
                   <a:srgbClr val="000000"/>
                 </a:solidFill>
@@ -5396,7 +5414,7 @@
               <a:t>; </a:t>
             </a:r>
             <a:r>
-              <a:rPr lang="en-US" dirty="0">
+              <a:rPr lang="en-US" sz="3200">
                 <a:solidFill>
                   <a:srgbClr val="0000FF"/>
                 </a:solidFill>
@@ -5408,7 +5426,7 @@
               <a:t>set</a:t>
             </a:r>
             <a:r>
-              <a:rPr lang="en-US" dirty="0">
+              <a:rPr lang="en-US" sz="3200">
                 <a:solidFill>
                   <a:srgbClr val="000000"/>
                 </a:solidFill>
@@ -5421,11 +5439,8 @@
             </a:r>
           </a:p>
           <a:p>
-            <a:pPr marL="0" indent="0">
-              <a:buNone/>
-            </a:pPr>
-            <a:r>
-              <a:rPr lang="en-US" dirty="0">
+            <a:r>
+              <a:rPr lang="en-US" sz="3200">
                 <a:solidFill>
                   <a:srgbClr val="000000"/>
                 </a:solidFill>
@@ -5436,12 +5451,9 @@
               </a:rPr>
               <a:t>}</a:t>
             </a:r>
-            <a:endParaRPr lang="en-US" dirty="0" smtClean="0">
+            <a:endParaRPr lang="en-US" sz="3200" dirty="0">
               <a:sym typeface="Wingdings" panose="05000000000000000000" pitchFamily="2" charset="2"/>
             </a:endParaRPr>
-          </a:p>
-          <a:p>
-            <a:endParaRPr lang="en-US" dirty="0"/>
           </a:p>
         </p:txBody>
       </p:sp>
@@ -5458,9 +5470,88 @@
   <p:timing>
     <p:tnLst>
       <p:par>
-        <p:cTn id="1" dur="indefinite" restart="never" nodeType="tmRoot"/>
+        <p:cTn id="1" dur="indefinite" restart="never" nodeType="tmRoot">
+          <p:childTnLst>
+            <p:seq concurrent="1" nextAc="seek">
+              <p:cTn id="2" dur="indefinite" nodeType="mainSeq">
+                <p:childTnLst>
+                  <p:par>
+                    <p:cTn id="3" fill="hold">
+                      <p:stCondLst>
+                        <p:cond delay="indefinite"/>
+                      </p:stCondLst>
+                      <p:childTnLst>
+                        <p:par>
+                          <p:cTn id="4" fill="hold">
+                            <p:stCondLst>
+                              <p:cond delay="0"/>
+                            </p:stCondLst>
+                            <p:childTnLst>
+                              <p:par>
+                                <p:cTn id="5" presetID="10" presetClass="entr" presetSubtype="0" fill="hold" grpId="0" nodeType="clickEffect">
+                                  <p:stCondLst>
+                                    <p:cond delay="0"/>
+                                  </p:stCondLst>
+                                  <p:childTnLst>
+                                    <p:set>
+                                      <p:cBhvr>
+                                        <p:cTn id="6" dur="1" fill="hold">
+                                          <p:stCondLst>
+                                            <p:cond delay="0"/>
+                                          </p:stCondLst>
+                                        </p:cTn>
+                                        <p:tgtEl>
+                                          <p:spTgt spid="2"/>
+                                        </p:tgtEl>
+                                        <p:attrNameLst>
+                                          <p:attrName>style.visibility</p:attrName>
+                                        </p:attrNameLst>
+                                      </p:cBhvr>
+                                      <p:to>
+                                        <p:strVal val="visible"/>
+                                      </p:to>
+                                    </p:set>
+                                    <p:animEffect transition="in" filter="fade">
+                                      <p:cBhvr>
+                                        <p:cTn id="7" dur="500"/>
+                                        <p:tgtEl>
+                                          <p:spTgt spid="2"/>
+                                        </p:tgtEl>
+                                      </p:cBhvr>
+                                    </p:animEffect>
+                                  </p:childTnLst>
+                                </p:cTn>
+                              </p:par>
+                            </p:childTnLst>
+                          </p:cTn>
+                        </p:par>
+                      </p:childTnLst>
+                    </p:cTn>
+                  </p:par>
+                </p:childTnLst>
+              </p:cTn>
+              <p:prevCondLst>
+                <p:cond evt="onPrev" delay="0">
+                  <p:tgtEl>
+                    <p:sldTgt/>
+                  </p:tgtEl>
+                </p:cond>
+              </p:prevCondLst>
+              <p:nextCondLst>
+                <p:cond evt="onNext" delay="0">
+                  <p:tgtEl>
+                    <p:sldTgt/>
+                  </p:tgtEl>
+                </p:cond>
+              </p:nextCondLst>
+            </p:seq>
+          </p:childTnLst>
+        </p:cTn>
       </p:par>
     </p:tnLst>
+    <p:bldLst>
+      <p:bldP spid="2" grpId="0"/>
+    </p:bldLst>
   </p:timing>
 </p:sld>
 </file>
@@ -5632,6 +5723,13 @@
   <p:clrMapOvr>
     <a:masterClrMapping/>
   </p:clrMapOvr>
+  <p:timing>
+    <p:tnLst>
+      <p:par>
+        <p:cTn id="1" dur="indefinite" restart="never" nodeType="tmRoot"/>
+      </p:par>
+    </p:tnLst>
+  </p:timing>
 </p:sld>
 </file>
 
@@ -5792,6 +5890,13 @@
   <p:clrMapOvr>
     <a:masterClrMapping/>
   </p:clrMapOvr>
+  <p:timing>
+    <p:tnLst>
+      <p:par>
+        <p:cTn id="1" dur="indefinite" restart="never" nodeType="tmRoot"/>
+      </p:par>
+    </p:tnLst>
+  </p:timing>
 </p:sld>
 </file>
 
@@ -5864,6 +5969,13 @@
   <p:clrMapOvr>
     <a:masterClrMapping/>
   </p:clrMapOvr>
+  <p:timing>
+    <p:tnLst>
+      <p:par>
+        <p:cTn id="1" dur="indefinite" restart="never" nodeType="tmRoot"/>
+      </p:par>
+    </p:tnLst>
+  </p:timing>
 </p:sld>
 </file>
 
@@ -5989,6 +6101,13 @@
   <p:clrMapOvr>
     <a:masterClrMapping/>
   </p:clrMapOvr>
+  <p:timing>
+    <p:tnLst>
+      <p:par>
+        <p:cTn id="1" dur="indefinite" restart="never" nodeType="tmRoot"/>
+      </p:par>
+    </p:tnLst>
+  </p:timing>
 </p:sld>
 </file>
 
@@ -6046,6 +6165,13 @@
   <p:clrMapOvr>
     <a:masterClrMapping/>
   </p:clrMapOvr>
+  <p:timing>
+    <p:tnLst>
+      <p:par>
+        <p:cTn id="1" dur="indefinite" restart="never" nodeType="tmRoot"/>
+      </p:par>
+    </p:tnLst>
+  </p:timing>
 </p:sld>
 </file>
 
@@ -6913,13 +7039,8 @@
           <a:p>
             <a:r>
               <a:rPr lang="en-US" dirty="0" smtClean="0"/>
-              <a:t>Use </a:t>
-            </a:r>
-            <a:r>
-              <a:rPr lang="en-US" dirty="0" smtClean="0"/>
-              <a:t>standard conventions</a:t>
-            </a:r>
-            <a:endParaRPr lang="en-US" dirty="0" smtClean="0"/>
+              <a:t>Use standard conventions</a:t>
+            </a:r>
           </a:p>
           <a:p>
             <a:pPr lvl="1"/>
@@ -8679,6 +8800,15 @@
 </file>
 
 <file path=customXml/item1.xml><?xml version="1.0" encoding="utf-8"?>
+<?mso-contentType ?>
+<FormTemplates xmlns="http://schemas.microsoft.com/sharepoint/v3/contenttype/forms">
+  <Display>DocumentLibraryForm</Display>
+  <Edit>DocumentLibraryForm</Edit>
+  <New>DocumentLibraryForm</New>
+</FormTemplates>
+</file>
+
+<file path=customXml/item2.xml><?xml version="1.0" encoding="utf-8"?>
 <ct:contentTypeSchema xmlns:ct="http://schemas.microsoft.com/office/2006/metadata/contentType" xmlns:ma="http://schemas.microsoft.com/office/2006/metadata/properties/metaAttributes" ct:_="" ma:_="" ma:contentTypeName="Document" ma:contentTypeID="0x010100A9B9146463917044969030790F8D7E1F" ma:contentTypeVersion="1" ma:contentTypeDescription="Create a new document." ma:contentTypeScope="" ma:versionID="88cb810aac341a62f87e1e4b3de4b413">
   <xsd:schema xmlns:xsd="http://www.w3.org/2001/XMLSchema" xmlns:xs="http://www.w3.org/2001/XMLSchema" xmlns:p="http://schemas.microsoft.com/office/2006/metadata/properties" xmlns:ns3="239b4775-11ac-4188-ac69-b5b775bb2155" targetNamespace="http://schemas.microsoft.com/office/2006/metadata/properties" ma:root="true" ma:fieldsID="a6232b10dbb3dfcaf3920bb7009c4722" ns3:_="">
     <xsd:import namespace="239b4775-11ac-4188-ac69-b5b775bb2155"/>
@@ -8818,15 +8948,6 @@
 </ct:contentTypeSchema>
 </file>
 
-<file path=customXml/item2.xml><?xml version="1.0" encoding="utf-8"?>
-<?mso-contentType ?>
-<FormTemplates xmlns="http://schemas.microsoft.com/sharepoint/v3/contenttype/forms">
-  <Display>DocumentLibraryForm</Display>
-  <Edit>DocumentLibraryForm</Edit>
-  <New>DocumentLibraryForm</New>
-</FormTemplates>
-</file>
-
 <file path=customXml/item3.xml><?xml version="1.0" encoding="utf-8"?>
 <p:properties xmlns:p="http://schemas.microsoft.com/office/2006/metadata/properties" xmlns:xsi="http://www.w3.org/2001/XMLSchema-instance" xmlns:pc="http://schemas.microsoft.com/office/infopath/2007/PartnerControls">
   <documentManagement/>
@@ -8834,6 +8955,14 @@
 </file>
 
 <file path=customXml/itemProps1.xml><?xml version="1.0" encoding="utf-8"?>
+<ds:datastoreItem xmlns:ds="http://schemas.openxmlformats.org/officeDocument/2006/customXml" ds:itemID="{B0CA13EC-1D3C-4D6F-8D1C-E8A452CFC79A}">
+  <ds:schemaRefs>
+    <ds:schemaRef ds:uri="http://schemas.microsoft.com/sharepoint/v3/contenttype/forms"/>
+  </ds:schemaRefs>
+</ds:datastoreItem>
+</file>
+
+<file path=customXml/itemProps2.xml><?xml version="1.0" encoding="utf-8"?>
 <ds:datastoreItem xmlns:ds="http://schemas.openxmlformats.org/officeDocument/2006/customXml" ds:itemID="{0785A4C7-B234-45E3-92B4-D7E0909F829E}">
   <ds:schemaRefs>
     <ds:schemaRef ds:uri="http://schemas.microsoft.com/office/2006/metadata/contentType"/>
@@ -8847,14 +8976,6 @@
     <ds:schemaRef ds:uri="http://purl.org/dc/elements/1.1/"/>
     <ds:schemaRef ds:uri="http://purl.org/dc/terms/"/>
     <ds:schemaRef ds:uri="http://schemas.microsoft.com/internal/obd"/>
-  </ds:schemaRefs>
-</ds:datastoreItem>
-</file>
-
-<file path=customXml/itemProps2.xml><?xml version="1.0" encoding="utf-8"?>
-<ds:datastoreItem xmlns:ds="http://schemas.openxmlformats.org/officeDocument/2006/customXml" ds:itemID="{B0CA13EC-1D3C-4D6F-8D1C-E8A452CFC79A}">
-  <ds:schemaRefs>
-    <ds:schemaRef ds:uri="http://schemas.microsoft.com/sharepoint/v3/contenttype/forms"/>
   </ds:schemaRefs>
 </ds:datastoreItem>
 </file>

</xml_diff>